<commit_message>
Update Clean Code - Chapter 7.pptx
Completed reading chapter 7 (error handling)
</commit_message>
<xml_diff>
--- a/Clean Code - Chapter 7.pptx
+++ b/Clean Code - Chapter 7.pptx
@@ -5,7 +5,7 @@
     <p:sldMasterId id="2147483752" r:id="rId1"/>
   </p:sldMasterIdLst>
   <p:notesMasterIdLst>
-    <p:notesMasterId r:id="rId8"/>
+    <p:notesMasterId r:id="rId17"/>
   </p:notesMasterIdLst>
   <p:sldIdLst>
     <p:sldId id="256" r:id="rId2"/>
@@ -14,6 +14,15 @@
     <p:sldId id="259" r:id="rId5"/>
     <p:sldId id="260" r:id="rId6"/>
     <p:sldId id="261" r:id="rId7"/>
+    <p:sldId id="262" r:id="rId8"/>
+    <p:sldId id="263" r:id="rId9"/>
+    <p:sldId id="264" r:id="rId10"/>
+    <p:sldId id="265" r:id="rId11"/>
+    <p:sldId id="266" r:id="rId12"/>
+    <p:sldId id="267" r:id="rId13"/>
+    <p:sldId id="268" r:id="rId14"/>
+    <p:sldId id="269" r:id="rId15"/>
+    <p:sldId id="270" r:id="rId16"/>
   </p:sldIdLst>
   <p:sldSz cx="12192000" cy="6858000"/>
   <p:notesSz cx="6858000" cy="9144000"/>
@@ -202,7 +211,7 @@
           <a:p>
             <a:fld id="{1D672108-E471-4B40-AA84-0ACD4ECB72F8}" type="datetimeFigureOut">
               <a:rPr lang="en-US" smtClean="0"/>
-              <a:t>15-Jul-25</a:t>
+              <a:t>16-Jul-25</a:t>
             </a:fld>
             <a:endParaRPr lang="en-US"/>
           </a:p>
@@ -700,7 +709,7 @@
           <a:p>
             <a:fld id="{82EDB8D0-98ED-4B86-9D5F-E61ADC70144D}" type="datetimeFigureOut">
               <a:rPr lang="en-US" smtClean="0"/>
-              <a:t>15-Jul-25</a:t>
+              <a:t>16-Jul-25</a:t>
             </a:fld>
             <a:endParaRPr lang="en-US" dirty="0"/>
           </a:p>
@@ -1115,7 +1124,7 @@
           <a:p>
             <a:fld id="{82EDB8D0-98ED-4B86-9D5F-E61ADC70144D}" type="datetimeFigureOut">
               <a:rPr lang="en-US" smtClean="0"/>
-              <a:t>15-Jul-25</a:t>
+              <a:t>16-Jul-25</a:t>
             </a:fld>
             <a:endParaRPr lang="en-US"/>
           </a:p>
@@ -1607,7 +1616,7 @@
           <a:p>
             <a:fld id="{82EDB8D0-98ED-4B86-9D5F-E61ADC70144D}" type="datetimeFigureOut">
               <a:rPr lang="en-US" smtClean="0"/>
-              <a:t>15-Jul-25</a:t>
+              <a:t>16-Jul-25</a:t>
             </a:fld>
             <a:endParaRPr lang="en-US"/>
           </a:p>
@@ -2094,7 +2103,7 @@
           <a:p>
             <a:fld id="{82EDB8D0-98ED-4B86-9D5F-E61ADC70144D}" type="datetimeFigureOut">
               <a:rPr lang="en-US" smtClean="0"/>
-              <a:t>15-Jul-25</a:t>
+              <a:t>16-Jul-25</a:t>
             </a:fld>
             <a:endParaRPr lang="en-US" dirty="0"/>
           </a:p>
@@ -2863,7 +2872,7 @@
           <a:p>
             <a:fld id="{82EDB8D0-98ED-4B86-9D5F-E61ADC70144D}" type="datetimeFigureOut">
               <a:rPr lang="en-US" smtClean="0"/>
-              <a:t>15-Jul-25</a:t>
+              <a:t>16-Jul-25</a:t>
             </a:fld>
             <a:endParaRPr lang="en-US"/>
           </a:p>
@@ -3345,7 +3354,7 @@
           <a:p>
             <a:fld id="{82EDB8D0-98ED-4B86-9D5F-E61ADC70144D}" type="datetimeFigureOut">
               <a:rPr lang="en-US" smtClean="0"/>
-              <a:t>15-Jul-25</a:t>
+              <a:t>16-Jul-25</a:t>
             </a:fld>
             <a:endParaRPr lang="en-US"/>
           </a:p>
@@ -4041,7 +4050,7 @@
           <a:p>
             <a:fld id="{82EDB8D0-98ED-4B86-9D5F-E61ADC70144D}" type="datetimeFigureOut">
               <a:rPr lang="en-US" smtClean="0"/>
-              <a:t>15-Jul-25</a:t>
+              <a:t>16-Jul-25</a:t>
             </a:fld>
             <a:endParaRPr lang="en-US"/>
           </a:p>
@@ -4466,7 +4475,7 @@
           <a:p>
             <a:fld id="{82EDB8D0-98ED-4B86-9D5F-E61ADC70144D}" type="datetimeFigureOut">
               <a:rPr lang="en-US" smtClean="0"/>
-              <a:t>15-Jul-25</a:t>
+              <a:t>16-Jul-25</a:t>
             </a:fld>
             <a:endParaRPr lang="en-US"/>
           </a:p>
@@ -4863,7 +4872,7 @@
           <a:p>
             <a:fld id="{82EDB8D0-98ED-4B86-9D5F-E61ADC70144D}" type="datetimeFigureOut">
               <a:rPr lang="en-US" smtClean="0"/>
-              <a:t>15-Jul-25</a:t>
+              <a:t>16-Jul-25</a:t>
             </a:fld>
             <a:endParaRPr lang="en-US"/>
           </a:p>
@@ -5458,7 +5467,7 @@
           <a:p>
             <a:fld id="{82EDB8D0-98ED-4B86-9D5F-E61ADC70144D}" type="datetimeFigureOut">
               <a:rPr lang="en-US" smtClean="0"/>
-              <a:t>15-Jul-25</a:t>
+              <a:t>16-Jul-25</a:t>
             </a:fld>
             <a:endParaRPr lang="en-US"/>
           </a:p>
@@ -6033,7 +6042,7 @@
           <a:p>
             <a:fld id="{82EDB8D0-98ED-4B86-9D5F-E61ADC70144D}" type="datetimeFigureOut">
               <a:rPr lang="en-US" smtClean="0"/>
-              <a:t>15-Jul-25</a:t>
+              <a:t>16-Jul-25</a:t>
             </a:fld>
             <a:endParaRPr lang="en-US"/>
           </a:p>
@@ -6560,7 +6569,7 @@
             <a:fld id="{82EDB8D0-98ED-4B86-9D5F-E61ADC70144D}" type="datetimeFigureOut">
               <a:rPr lang="en-US" smtClean="0"/>
               <a:pPr/>
-              <a:t>15-Jul-25</a:t>
+              <a:t>16-Jul-25</a:t>
             </a:fld>
             <a:endParaRPr lang="en-US" dirty="0"/>
           </a:p>
@@ -7477,6 +7486,845 @@
 </p:sld>
 </file>
 
+<file path=ppt/slides/slide10.xml><?xml version="1.0" encoding="utf-8"?>
+<p:sld xmlns:a="http://schemas.openxmlformats.org/drawingml/2006/main" xmlns:r="http://schemas.openxmlformats.org/officeDocument/2006/relationships" xmlns:p="http://schemas.openxmlformats.org/presentationml/2006/main">
+  <p:cSld>
+    <p:spTree>
+      <p:nvGrpSpPr>
+        <p:cNvPr id="1" name=""/>
+        <p:cNvGrpSpPr/>
+        <p:nvPr/>
+      </p:nvGrpSpPr>
+      <p:grpSpPr>
+        <a:xfrm>
+          <a:off x="0" y="0"/>
+          <a:ext cx="0" cy="0"/>
+          <a:chOff x="0" y="0"/>
+          <a:chExt cx="0" cy="0"/>
+        </a:xfrm>
+      </p:grpSpPr>
+      <p:sp>
+        <p:nvSpPr>
+          <p:cNvPr id="2" name="Title 1">
+            <a:extLst>
+              <a:ext uri="{FF2B5EF4-FFF2-40B4-BE49-F238E27FC236}">
+                <a16:creationId xmlns:a16="http://schemas.microsoft.com/office/drawing/2014/main" id="{71531458-1D6A-578E-7E31-D8F4760AD550}"/>
+              </a:ext>
+            </a:extLst>
+          </p:cNvPr>
+          <p:cNvSpPr>
+            <a:spLocks noGrp="1"/>
+          </p:cNvSpPr>
+          <p:nvPr>
+            <p:ph type="title"/>
+          </p:nvPr>
+        </p:nvSpPr>
+        <p:spPr/>
+        <p:txBody>
+          <a:bodyPr/>
+          <a:lstStyle/>
+          <a:p>
+            <a:r>
+              <a:rPr lang="en-US" dirty="0"/>
+              <a:t>Define the Normal Flow</a:t>
+            </a:r>
+          </a:p>
+        </p:txBody>
+      </p:sp>
+      <p:sp>
+        <p:nvSpPr>
+          <p:cNvPr id="3" name="Content Placeholder 2">
+            <a:extLst>
+              <a:ext uri="{FF2B5EF4-FFF2-40B4-BE49-F238E27FC236}">
+                <a16:creationId xmlns:a16="http://schemas.microsoft.com/office/drawing/2014/main" id="{70DDCA70-2DED-3473-810F-BC12C9163F4E}"/>
+              </a:ext>
+            </a:extLst>
+          </p:cNvPr>
+          <p:cNvSpPr>
+            <a:spLocks noGrp="1"/>
+          </p:cNvSpPr>
+          <p:nvPr>
+            <p:ph idx="1"/>
+          </p:nvPr>
+        </p:nvSpPr>
+        <p:spPr/>
+        <p:txBody>
+          <a:bodyPr/>
+          <a:lstStyle/>
+          <a:p>
+            <a:r>
+              <a:rPr lang="en-US" dirty="0"/>
+              <a:t>Following good separation between business logic and error handling can sometimes lead to awkward code where exceptions clutter the main logic flow.</a:t>
+            </a:r>
+          </a:p>
+          <a:p>
+            <a:r>
+              <a:rPr lang="en-US" dirty="0"/>
+              <a:t>Use the Special Case Pattern when you have predictable “exceptional” scenarios that are actually part of normal business flow. Instead of forcing clients to handle theses cases with exceptions, encapsulate the special behavior in objects that conform to the expected interface.</a:t>
+            </a:r>
+          </a:p>
+        </p:txBody>
+      </p:sp>
+    </p:spTree>
+    <p:extLst>
+      <p:ext uri="{BB962C8B-B14F-4D97-AF65-F5344CB8AC3E}">
+        <p14:creationId xmlns:p14="http://schemas.microsoft.com/office/powerpoint/2010/main" val="2299766861"/>
+      </p:ext>
+    </p:extLst>
+  </p:cSld>
+  <p:clrMapOvr>
+    <a:masterClrMapping/>
+  </p:clrMapOvr>
+</p:sld>
+</file>
+
+<file path=ppt/slides/slide11.xml><?xml version="1.0" encoding="utf-8"?>
+<p:sld xmlns:a="http://schemas.openxmlformats.org/drawingml/2006/main" xmlns:r="http://schemas.openxmlformats.org/officeDocument/2006/relationships" xmlns:p="http://schemas.openxmlformats.org/presentationml/2006/main">
+  <p:cSld>
+    <p:spTree>
+      <p:nvGrpSpPr>
+        <p:cNvPr id="1" name=""/>
+        <p:cNvGrpSpPr/>
+        <p:nvPr/>
+      </p:nvGrpSpPr>
+      <p:grpSpPr>
+        <a:xfrm>
+          <a:off x="0" y="0"/>
+          <a:ext cx="0" cy="0"/>
+          <a:chOff x="0" y="0"/>
+          <a:chExt cx="0" cy="0"/>
+        </a:xfrm>
+      </p:grpSpPr>
+      <p:sp>
+        <p:nvSpPr>
+          <p:cNvPr id="2" name="Title 1">
+            <a:extLst>
+              <a:ext uri="{FF2B5EF4-FFF2-40B4-BE49-F238E27FC236}">
+                <a16:creationId xmlns:a16="http://schemas.microsoft.com/office/drawing/2014/main" id="{6BA5D472-AD2F-BD09-505C-2FD9536662CA}"/>
+              </a:ext>
+            </a:extLst>
+          </p:cNvPr>
+          <p:cNvSpPr>
+            <a:spLocks noGrp="1"/>
+          </p:cNvSpPr>
+          <p:nvPr>
+            <p:ph type="title"/>
+          </p:nvPr>
+        </p:nvSpPr>
+        <p:spPr/>
+        <p:txBody>
+          <a:bodyPr/>
+          <a:lstStyle/>
+          <a:p>
+            <a:r>
+              <a:rPr lang="en-US" dirty="0"/>
+              <a:t>Define the Normal Flow (cont.)</a:t>
+            </a:r>
+          </a:p>
+        </p:txBody>
+      </p:sp>
+      <p:pic>
+        <p:nvPicPr>
+          <p:cNvPr id="5" name="Content Placeholder 4" descr="A white background with black text&#10;&#10;Description automatically generated">
+            <a:extLst>
+              <a:ext uri="{FF2B5EF4-FFF2-40B4-BE49-F238E27FC236}">
+                <a16:creationId xmlns:a16="http://schemas.microsoft.com/office/drawing/2014/main" id="{0626A875-A8FD-9D88-54EB-E985EA2C5A73}"/>
+              </a:ext>
+            </a:extLst>
+          </p:cNvPr>
+          <p:cNvPicPr>
+            <a:picLocks noGrp="1" noChangeAspect="1"/>
+          </p:cNvPicPr>
+          <p:nvPr>
+            <p:ph idx="1"/>
+          </p:nvPr>
+        </p:nvPicPr>
+        <p:blipFill>
+          <a:blip r:embed="rId2">
+            <a:extLst>
+              <a:ext uri="{28A0092B-C50C-407E-A947-70E740481C1C}">
+                <a14:useLocalDpi xmlns:a14="http://schemas.microsoft.com/office/drawing/2010/main" val="0"/>
+              </a:ext>
+            </a:extLst>
+          </a:blip>
+          <a:stretch>
+            <a:fillRect/>
+          </a:stretch>
+        </p:blipFill>
+        <p:spPr>
+          <a:xfrm>
+            <a:off x="838200" y="2005262"/>
+            <a:ext cx="5730737" cy="2213811"/>
+          </a:xfrm>
+        </p:spPr>
+      </p:pic>
+      <p:pic>
+        <p:nvPicPr>
+          <p:cNvPr id="7" name="Picture 6">
+            <a:extLst>
+              <a:ext uri="{FF2B5EF4-FFF2-40B4-BE49-F238E27FC236}">
+                <a16:creationId xmlns:a16="http://schemas.microsoft.com/office/drawing/2014/main" id="{C313A754-7EFE-E487-DCD4-FCDB4DAA8B24}"/>
+              </a:ext>
+            </a:extLst>
+          </p:cNvPr>
+          <p:cNvPicPr>
+            <a:picLocks noChangeAspect="1"/>
+          </p:cNvPicPr>
+          <p:nvPr/>
+        </p:nvPicPr>
+        <p:blipFill>
+          <a:blip r:embed="rId3">
+            <a:extLst>
+              <a:ext uri="{28A0092B-C50C-407E-A947-70E740481C1C}">
+                <a14:useLocalDpi xmlns:a14="http://schemas.microsoft.com/office/drawing/2010/main" val="0"/>
+              </a:ext>
+            </a:extLst>
+          </a:blip>
+          <a:stretch>
+            <a:fillRect/>
+          </a:stretch>
+        </p:blipFill>
+        <p:spPr>
+          <a:xfrm>
+            <a:off x="4523874" y="4219073"/>
+            <a:ext cx="5998189" cy="1684422"/>
+          </a:xfrm>
+          <a:prstGeom prst="rect">
+            <a:avLst/>
+          </a:prstGeom>
+        </p:spPr>
+      </p:pic>
+    </p:spTree>
+    <p:extLst>
+      <p:ext uri="{BB962C8B-B14F-4D97-AF65-F5344CB8AC3E}">
+        <p14:creationId xmlns:p14="http://schemas.microsoft.com/office/powerpoint/2010/main" val="3952041288"/>
+      </p:ext>
+    </p:extLst>
+  </p:cSld>
+  <p:clrMapOvr>
+    <a:masterClrMapping/>
+  </p:clrMapOvr>
+</p:sld>
+</file>
+
+<file path=ppt/slides/slide12.xml><?xml version="1.0" encoding="utf-8"?>
+<p:sld xmlns:a="http://schemas.openxmlformats.org/drawingml/2006/main" xmlns:r="http://schemas.openxmlformats.org/officeDocument/2006/relationships" xmlns:p="http://schemas.openxmlformats.org/presentationml/2006/main">
+  <p:cSld>
+    <p:spTree>
+      <p:nvGrpSpPr>
+        <p:cNvPr id="1" name=""/>
+        <p:cNvGrpSpPr/>
+        <p:nvPr/>
+      </p:nvGrpSpPr>
+      <p:grpSpPr>
+        <a:xfrm>
+          <a:off x="0" y="0"/>
+          <a:ext cx="0" cy="0"/>
+          <a:chOff x="0" y="0"/>
+          <a:chExt cx="0" cy="0"/>
+        </a:xfrm>
+      </p:grpSpPr>
+      <p:sp>
+        <p:nvSpPr>
+          <p:cNvPr id="2" name="Title 1">
+            <a:extLst>
+              <a:ext uri="{FF2B5EF4-FFF2-40B4-BE49-F238E27FC236}">
+                <a16:creationId xmlns:a16="http://schemas.microsoft.com/office/drawing/2014/main" id="{9E967249-7484-A8E6-B891-28333D8DCACA}"/>
+              </a:ext>
+            </a:extLst>
+          </p:cNvPr>
+          <p:cNvSpPr>
+            <a:spLocks noGrp="1"/>
+          </p:cNvSpPr>
+          <p:nvPr>
+            <p:ph type="title"/>
+          </p:nvPr>
+        </p:nvSpPr>
+        <p:spPr/>
+        <p:txBody>
+          <a:bodyPr/>
+          <a:lstStyle/>
+          <a:p>
+            <a:r>
+              <a:rPr lang="en-US" dirty="0"/>
+              <a:t>Don’t Return Null</a:t>
+            </a:r>
+          </a:p>
+        </p:txBody>
+      </p:sp>
+      <p:sp>
+        <p:nvSpPr>
+          <p:cNvPr id="3" name="Content Placeholder 2">
+            <a:extLst>
+              <a:ext uri="{FF2B5EF4-FFF2-40B4-BE49-F238E27FC236}">
+                <a16:creationId xmlns:a16="http://schemas.microsoft.com/office/drawing/2014/main" id="{5CC48948-3222-BE74-9CBA-A35E9DDCA245}"/>
+              </a:ext>
+            </a:extLst>
+          </p:cNvPr>
+          <p:cNvSpPr>
+            <a:spLocks noGrp="1"/>
+          </p:cNvSpPr>
+          <p:nvPr>
+            <p:ph idx="1"/>
+          </p:nvPr>
+        </p:nvSpPr>
+        <p:spPr/>
+        <p:txBody>
+          <a:bodyPr/>
+          <a:lstStyle/>
+          <a:p>
+            <a:endParaRPr lang="en-US" dirty="0"/>
+          </a:p>
+          <a:p>
+            <a:r>
+              <a:rPr lang="en-US" dirty="0"/>
+              <a:t>The problem with returning null:</a:t>
+            </a:r>
+          </a:p>
+          <a:p>
+            <a:pPr lvl="1"/>
+            <a:r>
+              <a:rPr lang="en-US" dirty="0"/>
+              <a:t>Creates excessive null checks throughout the codebase.</a:t>
+            </a:r>
+          </a:p>
+          <a:p>
+            <a:pPr lvl="1"/>
+            <a:r>
+              <a:rPr lang="en-US" dirty="0"/>
+              <a:t>Forces callers to handle null cases, creating additional work and complexity.</a:t>
+            </a:r>
+          </a:p>
+          <a:p>
+            <a:pPr lvl="1"/>
+            <a:r>
+              <a:rPr lang="en-US" dirty="0"/>
+              <a:t>Missing just one check can cause </a:t>
+            </a:r>
+            <a:r>
+              <a:rPr lang="en-US" sz="2000" dirty="0" err="1"/>
+              <a:t>NullPointerException</a:t>
+            </a:r>
+            <a:r>
+              <a:rPr lang="en-US" dirty="0"/>
+              <a:t> and crash the application.</a:t>
+            </a:r>
+          </a:p>
+          <a:p>
+            <a:pPr lvl="1"/>
+            <a:r>
+              <a:rPr lang="en-US" dirty="0"/>
+              <a:t>Results in deeply nested, hard-to-read code.</a:t>
+            </a:r>
+          </a:p>
+          <a:p>
+            <a:pPr lvl="1"/>
+            <a:endParaRPr lang="en-US" dirty="0"/>
+          </a:p>
+        </p:txBody>
+      </p:sp>
+    </p:spTree>
+    <p:extLst>
+      <p:ext uri="{BB962C8B-B14F-4D97-AF65-F5344CB8AC3E}">
+        <p14:creationId xmlns:p14="http://schemas.microsoft.com/office/powerpoint/2010/main" val="2784106689"/>
+      </p:ext>
+    </p:extLst>
+  </p:cSld>
+  <p:clrMapOvr>
+    <a:masterClrMapping/>
+  </p:clrMapOvr>
+</p:sld>
+</file>
+
+<file path=ppt/slides/slide13.xml><?xml version="1.0" encoding="utf-8"?>
+<p:sld xmlns:a="http://schemas.openxmlformats.org/drawingml/2006/main" xmlns:r="http://schemas.openxmlformats.org/officeDocument/2006/relationships" xmlns:p="http://schemas.openxmlformats.org/presentationml/2006/main">
+  <p:cSld>
+    <p:spTree>
+      <p:nvGrpSpPr>
+        <p:cNvPr id="1" name=""/>
+        <p:cNvGrpSpPr/>
+        <p:nvPr/>
+      </p:nvGrpSpPr>
+      <p:grpSpPr>
+        <a:xfrm>
+          <a:off x="0" y="0"/>
+          <a:ext cx="0" cy="0"/>
+          <a:chOff x="0" y="0"/>
+          <a:chExt cx="0" cy="0"/>
+        </a:xfrm>
+      </p:grpSpPr>
+      <p:sp>
+        <p:nvSpPr>
+          <p:cNvPr id="2" name="Title 1">
+            <a:extLst>
+              <a:ext uri="{FF2B5EF4-FFF2-40B4-BE49-F238E27FC236}">
+                <a16:creationId xmlns:a16="http://schemas.microsoft.com/office/drawing/2014/main" id="{0E2B2FD7-CC52-953F-6278-F95F408C4D46}"/>
+              </a:ext>
+            </a:extLst>
+          </p:cNvPr>
+          <p:cNvSpPr>
+            <a:spLocks noGrp="1"/>
+          </p:cNvSpPr>
+          <p:nvPr>
+            <p:ph type="title"/>
+          </p:nvPr>
+        </p:nvSpPr>
+        <p:spPr/>
+        <p:txBody>
+          <a:bodyPr/>
+          <a:lstStyle/>
+          <a:p>
+            <a:r>
+              <a:rPr lang="en-US" dirty="0"/>
+              <a:t>Don’t Return Null (cont.)</a:t>
+            </a:r>
+          </a:p>
+        </p:txBody>
+      </p:sp>
+      <p:sp>
+        <p:nvSpPr>
+          <p:cNvPr id="3" name="Content Placeholder 2">
+            <a:extLst>
+              <a:ext uri="{FF2B5EF4-FFF2-40B4-BE49-F238E27FC236}">
+                <a16:creationId xmlns:a16="http://schemas.microsoft.com/office/drawing/2014/main" id="{0FD5F2C2-EAAE-3907-20A9-89EE868E76A0}"/>
+              </a:ext>
+            </a:extLst>
+          </p:cNvPr>
+          <p:cNvSpPr>
+            <a:spLocks noGrp="1"/>
+          </p:cNvSpPr>
+          <p:nvPr>
+            <p:ph idx="1"/>
+          </p:nvPr>
+        </p:nvSpPr>
+        <p:spPr/>
+        <p:txBody>
+          <a:bodyPr/>
+          <a:lstStyle/>
+          <a:p>
+            <a:r>
+              <a:rPr lang="en-US" dirty="0"/>
+              <a:t>Better alternatives to returning null:</a:t>
+            </a:r>
+          </a:p>
+          <a:p>
+            <a:pPr lvl="1"/>
+            <a:r>
+              <a:rPr lang="en-US" dirty="0"/>
+              <a:t>Throw an exception: that describes the problem.</a:t>
+            </a:r>
+          </a:p>
+          <a:p>
+            <a:pPr lvl="1"/>
+            <a:r>
+              <a:rPr lang="en-US" dirty="0"/>
+              <a:t>Return a Special Case object.</a:t>
+            </a:r>
+          </a:p>
+          <a:p>
+            <a:pPr lvl="1"/>
+            <a:r>
+              <a:rPr lang="en-US" dirty="0"/>
+              <a:t>Wrap third-party APIs.</a:t>
+            </a:r>
+          </a:p>
+          <a:p>
+            <a:r>
+              <a:rPr lang="en-US" dirty="0"/>
+              <a:t>Benefits:</a:t>
+            </a:r>
+          </a:p>
+          <a:p>
+            <a:pPr lvl="1"/>
+            <a:r>
+              <a:rPr lang="en-US" dirty="0"/>
+              <a:t>Cleaner code: eliminates defensive null checking.</a:t>
+            </a:r>
+          </a:p>
+          <a:p>
+            <a:pPr lvl="1"/>
+            <a:r>
+              <a:rPr lang="en-US" dirty="0"/>
+              <a:t>Fewer bugs: reduces </a:t>
+            </a:r>
+            <a:r>
+              <a:rPr lang="en-US" sz="2000" dirty="0" err="1"/>
+              <a:t>NullPointerException</a:t>
+            </a:r>
+            <a:r>
+              <a:rPr lang="en-US" dirty="0"/>
+              <a:t> risks.</a:t>
+            </a:r>
+          </a:p>
+          <a:p>
+            <a:pPr lvl="1"/>
+            <a:r>
+              <a:rPr lang="en-US" dirty="0"/>
+              <a:t>Better readability.</a:t>
+            </a:r>
+          </a:p>
+          <a:p>
+            <a:pPr lvl="1"/>
+            <a:r>
+              <a:rPr lang="en-US" dirty="0"/>
+              <a:t>Easier maintenance.</a:t>
+            </a:r>
+          </a:p>
+          <a:p>
+            <a:pPr lvl="1"/>
+            <a:endParaRPr lang="en-US" dirty="0"/>
+          </a:p>
+        </p:txBody>
+      </p:sp>
+    </p:spTree>
+    <p:extLst>
+      <p:ext uri="{BB962C8B-B14F-4D97-AF65-F5344CB8AC3E}">
+        <p14:creationId xmlns:p14="http://schemas.microsoft.com/office/powerpoint/2010/main" val="4182656097"/>
+      </p:ext>
+    </p:extLst>
+  </p:cSld>
+  <p:clrMapOvr>
+    <a:masterClrMapping/>
+  </p:clrMapOvr>
+</p:sld>
+</file>
+
+<file path=ppt/slides/slide14.xml><?xml version="1.0" encoding="utf-8"?>
+<p:sld xmlns:a="http://schemas.openxmlformats.org/drawingml/2006/main" xmlns:r="http://schemas.openxmlformats.org/officeDocument/2006/relationships" xmlns:p="http://schemas.openxmlformats.org/presentationml/2006/main">
+  <p:cSld>
+    <p:spTree>
+      <p:nvGrpSpPr>
+        <p:cNvPr id="1" name=""/>
+        <p:cNvGrpSpPr/>
+        <p:nvPr/>
+      </p:nvGrpSpPr>
+      <p:grpSpPr>
+        <a:xfrm>
+          <a:off x="0" y="0"/>
+          <a:ext cx="0" cy="0"/>
+          <a:chOff x="0" y="0"/>
+          <a:chExt cx="0" cy="0"/>
+        </a:xfrm>
+      </p:grpSpPr>
+      <p:sp>
+        <p:nvSpPr>
+          <p:cNvPr id="2" name="Title 1">
+            <a:extLst>
+              <a:ext uri="{FF2B5EF4-FFF2-40B4-BE49-F238E27FC236}">
+                <a16:creationId xmlns:a16="http://schemas.microsoft.com/office/drawing/2014/main" id="{7F21D4D4-1AB1-322D-9007-C6753693AD92}"/>
+              </a:ext>
+            </a:extLst>
+          </p:cNvPr>
+          <p:cNvSpPr>
+            <a:spLocks noGrp="1"/>
+          </p:cNvSpPr>
+          <p:nvPr>
+            <p:ph type="title"/>
+          </p:nvPr>
+        </p:nvSpPr>
+        <p:spPr/>
+        <p:txBody>
+          <a:bodyPr/>
+          <a:lstStyle/>
+          <a:p>
+            <a:r>
+              <a:rPr lang="en-US" dirty="0"/>
+              <a:t>Don’t Pass Null</a:t>
+            </a:r>
+          </a:p>
+        </p:txBody>
+      </p:sp>
+      <p:sp>
+        <p:nvSpPr>
+          <p:cNvPr id="3" name="Content Placeholder 2">
+            <a:extLst>
+              <a:ext uri="{FF2B5EF4-FFF2-40B4-BE49-F238E27FC236}">
+                <a16:creationId xmlns:a16="http://schemas.microsoft.com/office/drawing/2014/main" id="{FC66787D-EBBB-FE8C-4FC4-B16958EC2F6D}"/>
+              </a:ext>
+            </a:extLst>
+          </p:cNvPr>
+          <p:cNvSpPr>
+            <a:spLocks noGrp="1"/>
+          </p:cNvSpPr>
+          <p:nvPr>
+            <p:ph idx="1"/>
+          </p:nvPr>
+        </p:nvSpPr>
+        <p:spPr/>
+        <p:txBody>
+          <a:bodyPr/>
+          <a:lstStyle/>
+          <a:p>
+            <a:r>
+              <a:rPr lang="en-US"/>
+              <a:t>Passing </a:t>
+            </a:r>
+            <a:r>
+              <a:rPr lang="en-US" sz="2400"/>
+              <a:t>null</a:t>
+            </a:r>
+            <a:r>
+              <a:rPr lang="en-US"/>
+              <a:t> into methods is worse than returning </a:t>
+            </a:r>
+            <a:r>
+              <a:rPr lang="en-US" sz="2400"/>
+              <a:t>null</a:t>
+            </a:r>
+            <a:r>
+              <a:rPr lang="en-US"/>
+              <a:t> from.</a:t>
+            </a:r>
+          </a:p>
+          <a:p>
+            <a:endParaRPr lang="en-US" dirty="0"/>
+          </a:p>
+        </p:txBody>
+      </p:sp>
+      <p:pic>
+        <p:nvPicPr>
+          <p:cNvPr id="5" name="Picture 4" descr="A screenshot of a computer&#10;&#10;Description automatically generated">
+            <a:extLst>
+              <a:ext uri="{FF2B5EF4-FFF2-40B4-BE49-F238E27FC236}">
+                <a16:creationId xmlns:a16="http://schemas.microsoft.com/office/drawing/2014/main" id="{0F115304-10E0-B319-306C-F6E1C0EBE0A2}"/>
+              </a:ext>
+            </a:extLst>
+          </p:cNvPr>
+          <p:cNvPicPr>
+            <a:picLocks noChangeAspect="1"/>
+          </p:cNvPicPr>
+          <p:nvPr/>
+        </p:nvPicPr>
+        <p:blipFill>
+          <a:blip r:embed="rId2">
+            <a:extLst>
+              <a:ext uri="{28A0092B-C50C-407E-A947-70E740481C1C}">
+                <a14:useLocalDpi xmlns:a14="http://schemas.microsoft.com/office/drawing/2010/main" val="0"/>
+              </a:ext>
+            </a:extLst>
+          </a:blip>
+          <a:stretch>
+            <a:fillRect/>
+          </a:stretch>
+        </p:blipFill>
+        <p:spPr>
+          <a:xfrm>
+            <a:off x="1098687" y="2654310"/>
+            <a:ext cx="4572396" cy="2202371"/>
+          </a:xfrm>
+          <a:prstGeom prst="rect">
+            <a:avLst/>
+          </a:prstGeom>
+        </p:spPr>
+      </p:pic>
+      <p:pic>
+        <p:nvPicPr>
+          <p:cNvPr id="7" name="Picture 6" descr="A white text on a white background&#10;&#10;Description automatically generated">
+            <a:extLst>
+              <a:ext uri="{FF2B5EF4-FFF2-40B4-BE49-F238E27FC236}">
+                <a16:creationId xmlns:a16="http://schemas.microsoft.com/office/drawing/2014/main" id="{C58E2891-00E0-B622-6AF9-0B7868C69A4C}"/>
+              </a:ext>
+            </a:extLst>
+          </p:cNvPr>
+          <p:cNvPicPr>
+            <a:picLocks noChangeAspect="1"/>
+          </p:cNvPicPr>
+          <p:nvPr/>
+        </p:nvPicPr>
+        <p:blipFill>
+          <a:blip r:embed="rId3">
+            <a:extLst>
+              <a:ext uri="{28A0092B-C50C-407E-A947-70E740481C1C}">
+                <a14:useLocalDpi xmlns:a14="http://schemas.microsoft.com/office/drawing/2010/main" val="0"/>
+              </a:ext>
+            </a:extLst>
+          </a:blip>
+          <a:stretch>
+            <a:fillRect/>
+          </a:stretch>
+        </p:blipFill>
+        <p:spPr>
+          <a:xfrm>
+            <a:off x="6324164" y="2654310"/>
+            <a:ext cx="5029636" cy="1226926"/>
+          </a:xfrm>
+          <a:prstGeom prst="rect">
+            <a:avLst/>
+          </a:prstGeom>
+        </p:spPr>
+      </p:pic>
+      <p:pic>
+        <p:nvPicPr>
+          <p:cNvPr id="9" name="Picture 8">
+            <a:extLst>
+              <a:ext uri="{FF2B5EF4-FFF2-40B4-BE49-F238E27FC236}">
+                <a16:creationId xmlns:a16="http://schemas.microsoft.com/office/drawing/2014/main" id="{28D04E39-FD8B-2F62-3860-E108F064FA5F}"/>
+              </a:ext>
+            </a:extLst>
+          </p:cNvPr>
+          <p:cNvPicPr>
+            <a:picLocks noChangeAspect="1"/>
+          </p:cNvPicPr>
+          <p:nvPr/>
+        </p:nvPicPr>
+        <p:blipFill>
+          <a:blip r:embed="rId4"/>
+          <a:stretch>
+            <a:fillRect/>
+          </a:stretch>
+        </p:blipFill>
+        <p:spPr>
+          <a:xfrm>
+            <a:off x="6470104" y="4151770"/>
+            <a:ext cx="4084674" cy="1409822"/>
+          </a:xfrm>
+          <a:prstGeom prst="rect">
+            <a:avLst/>
+          </a:prstGeom>
+        </p:spPr>
+      </p:pic>
+    </p:spTree>
+    <p:extLst>
+      <p:ext uri="{BB962C8B-B14F-4D97-AF65-F5344CB8AC3E}">
+        <p14:creationId xmlns:p14="http://schemas.microsoft.com/office/powerpoint/2010/main" val="2421106315"/>
+      </p:ext>
+    </p:extLst>
+  </p:cSld>
+  <p:clrMapOvr>
+    <a:masterClrMapping/>
+  </p:clrMapOvr>
+</p:sld>
+</file>
+
+<file path=ppt/slides/slide15.xml><?xml version="1.0" encoding="utf-8"?>
+<p:sld xmlns:a="http://schemas.openxmlformats.org/drawingml/2006/main" xmlns:r="http://schemas.openxmlformats.org/officeDocument/2006/relationships" xmlns:p="http://schemas.openxmlformats.org/presentationml/2006/main">
+  <p:cSld>
+    <p:spTree>
+      <p:nvGrpSpPr>
+        <p:cNvPr id="1" name=""/>
+        <p:cNvGrpSpPr/>
+        <p:nvPr/>
+      </p:nvGrpSpPr>
+      <p:grpSpPr>
+        <a:xfrm>
+          <a:off x="0" y="0"/>
+          <a:ext cx="0" cy="0"/>
+          <a:chOff x="0" y="0"/>
+          <a:chExt cx="0" cy="0"/>
+        </a:xfrm>
+      </p:grpSpPr>
+      <p:sp>
+        <p:nvSpPr>
+          <p:cNvPr id="2" name="Title 1">
+            <a:extLst>
+              <a:ext uri="{FF2B5EF4-FFF2-40B4-BE49-F238E27FC236}">
+                <a16:creationId xmlns:a16="http://schemas.microsoft.com/office/drawing/2014/main" id="{138FAAAC-456B-0C4B-4FF2-6C8CF5E5B13E}"/>
+              </a:ext>
+            </a:extLst>
+          </p:cNvPr>
+          <p:cNvSpPr>
+            <a:spLocks noGrp="1"/>
+          </p:cNvSpPr>
+          <p:nvPr>
+            <p:ph type="title"/>
+          </p:nvPr>
+        </p:nvSpPr>
+        <p:spPr/>
+        <p:txBody>
+          <a:bodyPr/>
+          <a:lstStyle/>
+          <a:p>
+            <a:r>
+              <a:rPr lang="en-US" dirty="0"/>
+              <a:t>Don’t Pass Null (cont.)</a:t>
+            </a:r>
+          </a:p>
+        </p:txBody>
+      </p:sp>
+      <p:sp>
+        <p:nvSpPr>
+          <p:cNvPr id="3" name="Content Placeholder 2">
+            <a:extLst>
+              <a:ext uri="{FF2B5EF4-FFF2-40B4-BE49-F238E27FC236}">
+                <a16:creationId xmlns:a16="http://schemas.microsoft.com/office/drawing/2014/main" id="{B4593DAB-D6B1-62B9-6143-AAD0C106B106}"/>
+              </a:ext>
+            </a:extLst>
+          </p:cNvPr>
+          <p:cNvSpPr>
+            <a:spLocks noGrp="1"/>
+          </p:cNvSpPr>
+          <p:nvPr>
+            <p:ph idx="1"/>
+          </p:nvPr>
+        </p:nvSpPr>
+        <p:spPr/>
+        <p:txBody>
+          <a:bodyPr/>
+          <a:lstStyle/>
+          <a:p>
+            <a:r>
+              <a:rPr lang="en-US" dirty="0"/>
+              <a:t>Previous solutions don’t solve the problem.</a:t>
+            </a:r>
+          </a:p>
+          <a:p>
+            <a:r>
+              <a:rPr lang="en-US" dirty="0"/>
+              <a:t>In most programming languages there is no good way to deal with a </a:t>
+            </a:r>
+            <a:r>
+              <a:rPr lang="en-US" sz="2400" dirty="0"/>
+              <a:t>null</a:t>
+            </a:r>
+            <a:r>
+              <a:rPr lang="en-US" dirty="0"/>
+              <a:t> that is passed by a caller accidentally.</a:t>
+            </a:r>
+          </a:p>
+          <a:p>
+            <a:r>
+              <a:rPr lang="en-US" dirty="0"/>
+              <a:t>So, the rational approach is to forbid passing </a:t>
+            </a:r>
+            <a:r>
+              <a:rPr lang="en-US" sz="2400" dirty="0"/>
+              <a:t>null</a:t>
+            </a:r>
+            <a:r>
+              <a:rPr lang="en-US" dirty="0"/>
+              <a:t> by default.</a:t>
+            </a:r>
+          </a:p>
+          <a:p>
+            <a:pPr lvl="1"/>
+            <a:r>
+              <a:rPr lang="en-US" dirty="0"/>
+              <a:t>When you do, you can code with the knowledge that a </a:t>
+            </a:r>
+            <a:r>
+              <a:rPr lang="en-US" sz="2000" dirty="0"/>
+              <a:t>null</a:t>
+            </a:r>
+            <a:r>
+              <a:rPr lang="en-US" dirty="0"/>
+              <a:t> in an argument list tis an indication of a problem, and end with far fewer careless mistake.</a:t>
+            </a:r>
+          </a:p>
+        </p:txBody>
+      </p:sp>
+    </p:spTree>
+    <p:extLst>
+      <p:ext uri="{BB962C8B-B14F-4D97-AF65-F5344CB8AC3E}">
+        <p14:creationId xmlns:p14="http://schemas.microsoft.com/office/powerpoint/2010/main" val="4245345518"/>
+      </p:ext>
+    </p:extLst>
+  </p:cSld>
+  <p:clrMapOvr>
+    <a:masterClrMapping/>
+  </p:clrMapOvr>
+</p:sld>
+</file>
+
 <file path=ppt/slides/slide2.xml><?xml version="1.0" encoding="utf-8"?>
 <p:sld xmlns:a="http://schemas.openxmlformats.org/drawingml/2006/main" xmlns:r="http://schemas.openxmlformats.org/officeDocument/2006/relationships" xmlns:p="http://schemas.openxmlformats.org/presentationml/2006/main">
   <p:cSld>
@@ -8076,6 +8924,412 @@
     <p:extLst>
       <p:ext uri="{BB962C8B-B14F-4D97-AF65-F5344CB8AC3E}">
         <p14:creationId xmlns:p14="http://schemas.microsoft.com/office/powerpoint/2010/main" val="2988353795"/>
+      </p:ext>
+    </p:extLst>
+  </p:cSld>
+  <p:clrMapOvr>
+    <a:masterClrMapping/>
+  </p:clrMapOvr>
+</p:sld>
+</file>
+
+<file path=ppt/slides/slide7.xml><?xml version="1.0" encoding="utf-8"?>
+<p:sld xmlns:a="http://schemas.openxmlformats.org/drawingml/2006/main" xmlns:r="http://schemas.openxmlformats.org/officeDocument/2006/relationships" xmlns:p="http://schemas.openxmlformats.org/presentationml/2006/main">
+  <p:cSld>
+    <p:spTree>
+      <p:nvGrpSpPr>
+        <p:cNvPr id="1" name=""/>
+        <p:cNvGrpSpPr/>
+        <p:nvPr/>
+      </p:nvGrpSpPr>
+      <p:grpSpPr>
+        <a:xfrm>
+          <a:off x="0" y="0"/>
+          <a:ext cx="0" cy="0"/>
+          <a:chOff x="0" y="0"/>
+          <a:chExt cx="0" cy="0"/>
+        </a:xfrm>
+      </p:grpSpPr>
+      <p:sp>
+        <p:nvSpPr>
+          <p:cNvPr id="2" name="Title 1">
+            <a:extLst>
+              <a:ext uri="{FF2B5EF4-FFF2-40B4-BE49-F238E27FC236}">
+                <a16:creationId xmlns:a16="http://schemas.microsoft.com/office/drawing/2014/main" id="{B1668E3E-8093-97BB-A3CF-808B002DA907}"/>
+              </a:ext>
+            </a:extLst>
+          </p:cNvPr>
+          <p:cNvSpPr>
+            <a:spLocks noGrp="1"/>
+          </p:cNvSpPr>
+          <p:nvPr>
+            <p:ph type="title"/>
+          </p:nvPr>
+        </p:nvSpPr>
+        <p:spPr/>
+        <p:txBody>
+          <a:bodyPr/>
+          <a:lstStyle/>
+          <a:p>
+            <a:r>
+              <a:rPr lang="en-US" dirty="0"/>
+              <a:t>Define Exception Classes in Terms of a Caller’s Needs</a:t>
+            </a:r>
+          </a:p>
+        </p:txBody>
+      </p:sp>
+      <p:sp>
+        <p:nvSpPr>
+          <p:cNvPr id="3" name="Content Placeholder 2">
+            <a:extLst>
+              <a:ext uri="{FF2B5EF4-FFF2-40B4-BE49-F238E27FC236}">
+                <a16:creationId xmlns:a16="http://schemas.microsoft.com/office/drawing/2014/main" id="{9F976152-2BA2-4F41-0C35-237D04BA0714}"/>
+              </a:ext>
+            </a:extLst>
+          </p:cNvPr>
+          <p:cNvSpPr>
+            <a:spLocks noGrp="1"/>
+          </p:cNvSpPr>
+          <p:nvPr>
+            <p:ph idx="1"/>
+          </p:nvPr>
+        </p:nvSpPr>
+        <p:spPr/>
+        <p:txBody>
+          <a:bodyPr/>
+          <a:lstStyle/>
+          <a:p>
+            <a:r>
+              <a:rPr lang="en-US" dirty="0"/>
+              <a:t>We can classify errors by their (source/type), but the most important concern should be </a:t>
+            </a:r>
+            <a:r>
+              <a:rPr lang="en-US" i="1" dirty="0"/>
+              <a:t>how they are caught</a:t>
+            </a:r>
+            <a:r>
+              <a:rPr lang="en-US" dirty="0"/>
+              <a:t>.</a:t>
+            </a:r>
+          </a:p>
+          <a:p>
+            <a:endParaRPr lang="en-US" dirty="0"/>
+          </a:p>
+          <a:p>
+            <a:endParaRPr lang="en-US" dirty="0"/>
+          </a:p>
+        </p:txBody>
+      </p:sp>
+      <p:pic>
+        <p:nvPicPr>
+          <p:cNvPr id="5" name="Picture 4" descr="A screen shot of a computer code&#10;&#10;Description automatically generated">
+            <a:extLst>
+              <a:ext uri="{FF2B5EF4-FFF2-40B4-BE49-F238E27FC236}">
+                <a16:creationId xmlns:a16="http://schemas.microsoft.com/office/drawing/2014/main" id="{44C27E7B-10B7-85AD-3B5A-5155CA9FE04C}"/>
+              </a:ext>
+            </a:extLst>
+          </p:cNvPr>
+          <p:cNvPicPr>
+            <a:picLocks noChangeAspect="1"/>
+          </p:cNvPicPr>
+          <p:nvPr/>
+        </p:nvPicPr>
+        <p:blipFill>
+          <a:blip r:embed="rId2">
+            <a:extLst>
+              <a:ext uri="{28A0092B-C50C-407E-A947-70E740481C1C}">
+                <a14:useLocalDpi xmlns:a14="http://schemas.microsoft.com/office/drawing/2010/main" val="0"/>
+              </a:ext>
+            </a:extLst>
+          </a:blip>
+          <a:stretch>
+            <a:fillRect/>
+          </a:stretch>
+        </p:blipFill>
+        <p:spPr>
+          <a:xfrm>
+            <a:off x="1993501" y="2819999"/>
+            <a:ext cx="3878916" cy="2865368"/>
+          </a:xfrm>
+          <a:prstGeom prst="rect">
+            <a:avLst/>
+          </a:prstGeom>
+        </p:spPr>
+      </p:pic>
+      <p:pic>
+        <p:nvPicPr>
+          <p:cNvPr id="7" name="Picture 6" descr="A computer code with text&#10;&#10;Description automatically generated">
+            <a:extLst>
+              <a:ext uri="{FF2B5EF4-FFF2-40B4-BE49-F238E27FC236}">
+                <a16:creationId xmlns:a16="http://schemas.microsoft.com/office/drawing/2014/main" id="{F63E99DA-A961-4C95-20FB-2844EBCEA6FF}"/>
+              </a:ext>
+            </a:extLst>
+          </p:cNvPr>
+          <p:cNvPicPr>
+            <a:picLocks noChangeAspect="1"/>
+          </p:cNvPicPr>
+          <p:nvPr/>
+        </p:nvPicPr>
+        <p:blipFill>
+          <a:blip r:embed="rId3">
+            <a:extLst>
+              <a:ext uri="{28A0092B-C50C-407E-A947-70E740481C1C}">
+                <a14:useLocalDpi xmlns:a14="http://schemas.microsoft.com/office/drawing/2010/main" val="0"/>
+              </a:ext>
+            </a:extLst>
+          </a:blip>
+          <a:stretch>
+            <a:fillRect/>
+          </a:stretch>
+        </p:blipFill>
+        <p:spPr>
+          <a:xfrm>
+            <a:off x="7027718" y="2951516"/>
+            <a:ext cx="2949196" cy="1607959"/>
+          </a:xfrm>
+          <a:prstGeom prst="rect">
+            <a:avLst/>
+          </a:prstGeom>
+        </p:spPr>
+      </p:pic>
+    </p:spTree>
+    <p:extLst>
+      <p:ext uri="{BB962C8B-B14F-4D97-AF65-F5344CB8AC3E}">
+        <p14:creationId xmlns:p14="http://schemas.microsoft.com/office/powerpoint/2010/main" val="2440298804"/>
+      </p:ext>
+    </p:extLst>
+  </p:cSld>
+  <p:clrMapOvr>
+    <a:masterClrMapping/>
+  </p:clrMapOvr>
+</p:sld>
+</file>
+
+<file path=ppt/slides/slide8.xml><?xml version="1.0" encoding="utf-8"?>
+<p:sld xmlns:a="http://schemas.openxmlformats.org/drawingml/2006/main" xmlns:r="http://schemas.openxmlformats.org/officeDocument/2006/relationships" xmlns:p="http://schemas.openxmlformats.org/presentationml/2006/main">
+  <p:cSld>
+    <p:spTree>
+      <p:nvGrpSpPr>
+        <p:cNvPr id="1" name=""/>
+        <p:cNvGrpSpPr/>
+        <p:nvPr/>
+      </p:nvGrpSpPr>
+      <p:grpSpPr>
+        <a:xfrm>
+          <a:off x="0" y="0"/>
+          <a:ext cx="0" cy="0"/>
+          <a:chOff x="0" y="0"/>
+          <a:chExt cx="0" cy="0"/>
+        </a:xfrm>
+      </p:grpSpPr>
+      <p:sp>
+        <p:nvSpPr>
+          <p:cNvPr id="2" name="Title 1">
+            <a:extLst>
+              <a:ext uri="{FF2B5EF4-FFF2-40B4-BE49-F238E27FC236}">
+                <a16:creationId xmlns:a16="http://schemas.microsoft.com/office/drawing/2014/main" id="{55A45619-62F4-4941-0600-11C25379F610}"/>
+              </a:ext>
+            </a:extLst>
+          </p:cNvPr>
+          <p:cNvSpPr>
+            <a:spLocks noGrp="1"/>
+          </p:cNvSpPr>
+          <p:nvPr>
+            <p:ph type="title"/>
+          </p:nvPr>
+        </p:nvSpPr>
+        <p:spPr/>
+        <p:txBody>
+          <a:bodyPr/>
+          <a:lstStyle/>
+          <a:p>
+            <a:r>
+              <a:rPr lang="en-US" dirty="0"/>
+              <a:t>Define Exception Classes in Terms of a Caller’s Needs (cont.)</a:t>
+            </a:r>
+          </a:p>
+        </p:txBody>
+      </p:sp>
+      <p:sp>
+        <p:nvSpPr>
+          <p:cNvPr id="3" name="Content Placeholder 2">
+            <a:extLst>
+              <a:ext uri="{FF2B5EF4-FFF2-40B4-BE49-F238E27FC236}">
+                <a16:creationId xmlns:a16="http://schemas.microsoft.com/office/drawing/2014/main" id="{C00ACE2E-D283-B48A-691C-06213931DB35}"/>
+              </a:ext>
+            </a:extLst>
+          </p:cNvPr>
+          <p:cNvSpPr>
+            <a:spLocks noGrp="1"/>
+          </p:cNvSpPr>
+          <p:nvPr>
+            <p:ph idx="1"/>
+          </p:nvPr>
+        </p:nvSpPr>
+        <p:spPr/>
+        <p:txBody>
+          <a:bodyPr/>
+          <a:lstStyle/>
+          <a:p>
+            <a:endParaRPr lang="en-US" dirty="0"/>
+          </a:p>
+          <a:p>
+            <a:r>
+              <a:rPr lang="en-US" dirty="0"/>
+              <a:t>Instead of handling multiple specific exceptions, create a wrapper class that:</a:t>
+            </a:r>
+          </a:p>
+          <a:p>
+            <a:pPr lvl="1"/>
+            <a:r>
+              <a:rPr lang="en-US" dirty="0"/>
+              <a:t>encapsulates the third-party API.</a:t>
+            </a:r>
+          </a:p>
+          <a:p>
+            <a:pPr lvl="1"/>
+            <a:r>
+              <a:rPr lang="en-US" dirty="0"/>
+              <a:t>catches all the various exceptions internally.</a:t>
+            </a:r>
+          </a:p>
+          <a:p>
+            <a:pPr lvl="1"/>
+            <a:r>
+              <a:rPr lang="en-US" dirty="0"/>
+              <a:t>translates them into a single, common exception type.</a:t>
+            </a:r>
+          </a:p>
+          <a:p>
+            <a:pPr lvl="1"/>
+            <a:r>
+              <a:rPr lang="en-US" dirty="0"/>
+              <a:t>allows the calling code to handle just one exception type.</a:t>
+            </a:r>
+          </a:p>
+          <a:p>
+            <a:endParaRPr lang="en-US" dirty="0"/>
+          </a:p>
+        </p:txBody>
+      </p:sp>
+    </p:spTree>
+    <p:extLst>
+      <p:ext uri="{BB962C8B-B14F-4D97-AF65-F5344CB8AC3E}">
+        <p14:creationId xmlns:p14="http://schemas.microsoft.com/office/powerpoint/2010/main" val="3719457527"/>
+      </p:ext>
+    </p:extLst>
+  </p:cSld>
+  <p:clrMapOvr>
+    <a:masterClrMapping/>
+  </p:clrMapOvr>
+</p:sld>
+</file>
+
+<file path=ppt/slides/slide9.xml><?xml version="1.0" encoding="utf-8"?>
+<p:sld xmlns:a="http://schemas.openxmlformats.org/drawingml/2006/main" xmlns:r="http://schemas.openxmlformats.org/officeDocument/2006/relationships" xmlns:p="http://schemas.openxmlformats.org/presentationml/2006/main">
+  <p:cSld>
+    <p:spTree>
+      <p:nvGrpSpPr>
+        <p:cNvPr id="1" name=""/>
+        <p:cNvGrpSpPr/>
+        <p:nvPr/>
+      </p:nvGrpSpPr>
+      <p:grpSpPr>
+        <a:xfrm>
+          <a:off x="0" y="0"/>
+          <a:ext cx="0" cy="0"/>
+          <a:chOff x="0" y="0"/>
+          <a:chExt cx="0" cy="0"/>
+        </a:xfrm>
+      </p:grpSpPr>
+      <p:sp>
+        <p:nvSpPr>
+          <p:cNvPr id="2" name="Title 1">
+            <a:extLst>
+              <a:ext uri="{FF2B5EF4-FFF2-40B4-BE49-F238E27FC236}">
+                <a16:creationId xmlns:a16="http://schemas.microsoft.com/office/drawing/2014/main" id="{1D19301F-0848-9463-69E2-C23817C029CE}"/>
+              </a:ext>
+            </a:extLst>
+          </p:cNvPr>
+          <p:cNvSpPr>
+            <a:spLocks noGrp="1"/>
+          </p:cNvSpPr>
+          <p:nvPr>
+            <p:ph type="title"/>
+          </p:nvPr>
+        </p:nvSpPr>
+        <p:spPr/>
+        <p:txBody>
+          <a:bodyPr/>
+          <a:lstStyle/>
+          <a:p>
+            <a:r>
+              <a:rPr lang="en-US" dirty="0"/>
+              <a:t>Define Exception Classes in Terms of a Caller’s Needs (cont.)</a:t>
+            </a:r>
+          </a:p>
+        </p:txBody>
+      </p:sp>
+      <p:sp>
+        <p:nvSpPr>
+          <p:cNvPr id="3" name="Content Placeholder 2">
+            <a:extLst>
+              <a:ext uri="{FF2B5EF4-FFF2-40B4-BE49-F238E27FC236}">
+                <a16:creationId xmlns:a16="http://schemas.microsoft.com/office/drawing/2014/main" id="{45A97061-6B09-2432-9F2B-C00A2321C807}"/>
+              </a:ext>
+            </a:extLst>
+          </p:cNvPr>
+          <p:cNvSpPr>
+            <a:spLocks noGrp="1"/>
+          </p:cNvSpPr>
+          <p:nvPr>
+            <p:ph idx="1"/>
+          </p:nvPr>
+        </p:nvSpPr>
+        <p:spPr/>
+        <p:txBody>
+          <a:bodyPr/>
+          <a:lstStyle/>
+          <a:p>
+            <a:r>
+              <a:rPr lang="en-US" dirty="0"/>
+              <a:t>Benefits of wrapping a third-party APIs:</a:t>
+            </a:r>
+          </a:p>
+          <a:p>
+            <a:pPr lvl="1"/>
+            <a:r>
+              <a:rPr lang="en-US" dirty="0"/>
+              <a:t>Reduces dependencies: makes it easier to switch to different libraries later.</a:t>
+            </a:r>
+          </a:p>
+          <a:p>
+            <a:pPr lvl="1"/>
+            <a:r>
+              <a:rPr lang="en-US" dirty="0"/>
+              <a:t>Improves testability: easier to mock third-party calls during testing.</a:t>
+            </a:r>
+          </a:p>
+          <a:p>
+            <a:pPr lvl="1"/>
+            <a:r>
+              <a:rPr lang="en-US" dirty="0"/>
+              <a:t>Design freedom: you can define APIs that feel comfortable rather than being tied to vendor choices.</a:t>
+            </a:r>
+          </a:p>
+          <a:p>
+            <a:pPr lvl="1"/>
+            <a:r>
+              <a:rPr lang="en-US" dirty="0"/>
+              <a:t>Cleaner code: single exception handling instead of multiple duplicate catch blocks.</a:t>
+            </a:r>
+          </a:p>
+        </p:txBody>
+      </p:sp>
+    </p:spTree>
+    <p:extLst>
+      <p:ext uri="{BB962C8B-B14F-4D97-AF65-F5344CB8AC3E}">
+        <p14:creationId xmlns:p14="http://schemas.microsoft.com/office/powerpoint/2010/main" val="2115072927"/>
       </p:ext>
     </p:extLst>
   </p:cSld>

</xml_diff>